<commit_message>
update lecture 05 materials
</commit_message>
<xml_diff>
--- a/lecture/Lecture 05 Sept 12/5 Merge-Groupby.pptx
+++ b/lecture/Lecture 05 Sept 12/5 Merge-Groupby.pptx
@@ -481,6 +481,180 @@
     </a:lvl9pPr>
   </p:notesStyle>
 </p:notesMaster>
+</file>
+
+<file path=ppt/notesSlides/notesSlide1.xml><?xml version="1.0" encoding="utf-8"?>
+<p:notes xmlns:a="http://schemas.openxmlformats.org/drawingml/2006/main" xmlns:r="http://schemas.openxmlformats.org/officeDocument/2006/relationships" xmlns:p="http://schemas.openxmlformats.org/presentationml/2006/main">
+  <p:cSld>
+    <p:spTree>
+      <p:nvGrpSpPr>
+        <p:cNvPr id="1" name=""/>
+        <p:cNvGrpSpPr/>
+        <p:nvPr/>
+      </p:nvGrpSpPr>
+      <p:grpSpPr>
+        <a:xfrm>
+          <a:off x="0" y="0"/>
+          <a:ext cx="0" cy="0"/>
+          <a:chOff x="0" y="0"/>
+          <a:chExt cx="0" cy="0"/>
+        </a:xfrm>
+      </p:grpSpPr>
+      <p:sp>
+        <p:nvSpPr>
+          <p:cNvPr id="2" name="Slide Image Placeholder 1"/>
+          <p:cNvSpPr>
+            <a:spLocks noGrp="1" noRot="1" noChangeAspect="1"/>
+          </p:cNvSpPr>
+          <p:nvPr>
+            <p:ph type="sldImg"/>
+          </p:nvPr>
+        </p:nvSpPr>
+        <p:spPr/>
+      </p:sp>
+      <p:sp>
+        <p:nvSpPr>
+          <p:cNvPr id="3" name="Notes Placeholder 2"/>
+          <p:cNvSpPr>
+            <a:spLocks noGrp="1"/>
+          </p:cNvSpPr>
+          <p:nvPr>
+            <p:ph type="body" idx="1"/>
+          </p:nvPr>
+        </p:nvSpPr>
+        <p:spPr/>
+        <p:txBody>
+          <a:bodyPr/>
+          <a:lstStyle/>
+          <a:p>
+            <a:r>
+              <a:rPr lang="en-US" dirty="0"/>
+              <a:t>Though there is no strong causal support for the AQI values, are they still meaningless or not useful?</a:t>
+            </a:r>
+          </a:p>
+        </p:txBody>
+      </p:sp>
+      <p:sp>
+        <p:nvSpPr>
+          <p:cNvPr id="4" name="Slide Number Placeholder 3"/>
+          <p:cNvSpPr>
+            <a:spLocks noGrp="1"/>
+          </p:cNvSpPr>
+          <p:nvPr>
+            <p:ph type="sldNum" sz="quarter" idx="5"/>
+          </p:nvPr>
+        </p:nvSpPr>
+        <p:spPr/>
+        <p:txBody>
+          <a:bodyPr/>
+          <a:lstStyle/>
+          <a:p>
+            <a:fld id="{D819A83E-0401-A34D-9C72-7E11B0EBD118}" type="slidenum">
+              <a:rPr lang="en-US" smtClean="0"/>
+              <a:t>5</a:t>
+            </a:fld>
+            <a:endParaRPr lang="en-US"/>
+          </a:p>
+        </p:txBody>
+      </p:sp>
+    </p:spTree>
+    <p:extLst>
+      <p:ext uri="{BB962C8B-B14F-4D97-AF65-F5344CB8AC3E}">
+        <p14:creationId xmlns:p14="http://schemas.microsoft.com/office/powerpoint/2010/main" val="3591965716"/>
+      </p:ext>
+    </p:extLst>
+  </p:cSld>
+  <p:clrMapOvr>
+    <a:masterClrMapping/>
+  </p:clrMapOvr>
+</p:notes>
+</file>
+
+<file path=ppt/notesSlides/notesSlide2.xml><?xml version="1.0" encoding="utf-8"?>
+<p:notes xmlns:a="http://schemas.openxmlformats.org/drawingml/2006/main" xmlns:r="http://schemas.openxmlformats.org/officeDocument/2006/relationships" xmlns:p="http://schemas.openxmlformats.org/presentationml/2006/main">
+  <p:cSld>
+    <p:spTree>
+      <p:nvGrpSpPr>
+        <p:cNvPr id="1" name=""/>
+        <p:cNvGrpSpPr/>
+        <p:nvPr/>
+      </p:nvGrpSpPr>
+      <p:grpSpPr>
+        <a:xfrm>
+          <a:off x="0" y="0"/>
+          <a:ext cx="0" cy="0"/>
+          <a:chOff x="0" y="0"/>
+          <a:chExt cx="0" cy="0"/>
+        </a:xfrm>
+      </p:grpSpPr>
+      <p:sp>
+        <p:nvSpPr>
+          <p:cNvPr id="2" name="Slide Image Placeholder 1"/>
+          <p:cNvSpPr>
+            <a:spLocks noGrp="1" noRot="1" noChangeAspect="1"/>
+          </p:cNvSpPr>
+          <p:nvPr>
+            <p:ph type="sldImg"/>
+          </p:nvPr>
+        </p:nvSpPr>
+        <p:spPr/>
+      </p:sp>
+      <p:sp>
+        <p:nvSpPr>
+          <p:cNvPr id="3" name="Notes Placeholder 2"/>
+          <p:cNvSpPr>
+            <a:spLocks noGrp="1"/>
+          </p:cNvSpPr>
+          <p:nvPr>
+            <p:ph type="body" idx="1"/>
+          </p:nvPr>
+        </p:nvSpPr>
+        <p:spPr/>
+        <p:txBody>
+          <a:bodyPr/>
+          <a:lstStyle/>
+          <a:p>
+            <a:r>
+              <a:rPr lang="en-US" dirty="0"/>
+              <a:t>Note this type of merge is an “inner” merge.  Later in the course we’ll talk about outer, left, and right merges.</a:t>
+            </a:r>
+          </a:p>
+        </p:txBody>
+      </p:sp>
+      <p:sp>
+        <p:nvSpPr>
+          <p:cNvPr id="4" name="Slide Number Placeholder 3"/>
+          <p:cNvSpPr>
+            <a:spLocks noGrp="1"/>
+          </p:cNvSpPr>
+          <p:nvPr>
+            <p:ph type="sldNum" sz="quarter" idx="5"/>
+          </p:nvPr>
+        </p:nvSpPr>
+        <p:spPr/>
+        <p:txBody>
+          <a:bodyPr/>
+          <a:lstStyle/>
+          <a:p>
+            <a:fld id="{D819A83E-0401-A34D-9C72-7E11B0EBD118}" type="slidenum">
+              <a:rPr lang="en-US" smtClean="0"/>
+              <a:t>9</a:t>
+            </a:fld>
+            <a:endParaRPr lang="en-US"/>
+          </a:p>
+        </p:txBody>
+      </p:sp>
+    </p:spTree>
+    <p:extLst>
+      <p:ext uri="{BB962C8B-B14F-4D97-AF65-F5344CB8AC3E}">
+        <p14:creationId xmlns:p14="http://schemas.microsoft.com/office/powerpoint/2010/main" val="2880184787"/>
+      </p:ext>
+    </p:extLst>
+  </p:cSld>
+  <p:clrMapOvr>
+    <a:masterClrMapping/>
+  </p:clrMapOvr>
+</p:notes>
 </file>
 
 <file path=ppt/slideLayouts/slideLayout1.xml><?xml version="1.0" encoding="utf-8"?>
@@ -35974,7 +36148,7 @@
           <p:nvPr/>
         </p:nvPicPr>
         <p:blipFill>
-          <a:blip r:embed="rId2"/>
+          <a:blip r:embed="rId3"/>
           <a:stretch>
             <a:fillRect/>
           </a:stretch>
@@ -36038,6 +36212,116 @@
   <p:clrMapOvr>
     <a:masterClrMapping/>
   </p:clrMapOvr>
+  <p:timing>
+    <p:tnLst>
+      <p:par>
+        <p:cTn id="1" dur="indefinite" restart="never" nodeType="tmRoot">
+          <p:childTnLst>
+            <p:seq concurrent="1" nextAc="seek">
+              <p:cTn id="2" dur="indefinite" nodeType="mainSeq">
+                <p:childTnLst>
+                  <p:par>
+                    <p:cTn id="3" fill="hold">
+                      <p:stCondLst>
+                        <p:cond delay="indefinite"/>
+                      </p:stCondLst>
+                      <p:childTnLst>
+                        <p:par>
+                          <p:cTn id="4" fill="hold">
+                            <p:stCondLst>
+                              <p:cond delay="0"/>
+                            </p:stCondLst>
+                            <p:childTnLst>
+                              <p:par>
+                                <p:cTn id="5" presetID="1" presetClass="entr" presetSubtype="0" fill="hold" nodeType="clickEffect">
+                                  <p:stCondLst>
+                                    <p:cond delay="0"/>
+                                  </p:stCondLst>
+                                  <p:childTnLst>
+                                    <p:set>
+                                      <p:cBhvr>
+                                        <p:cTn id="6" dur="1" fill="hold">
+                                          <p:stCondLst>
+                                            <p:cond delay="0"/>
+                                          </p:stCondLst>
+                                        </p:cTn>
+                                        <p:tgtEl>
+                                          <p:spTgt spid="3">
+                                            <p:txEl>
+                                              <p:pRg st="4" end="4"/>
+                                            </p:txEl>
+                                          </p:spTgt>
+                                        </p:tgtEl>
+                                        <p:attrNameLst>
+                                          <p:attrName>style.visibility</p:attrName>
+                                        </p:attrNameLst>
+                                      </p:cBhvr>
+                                      <p:to>
+                                        <p:strVal val="visible"/>
+                                      </p:to>
+                                    </p:set>
+                                  </p:childTnLst>
+                                </p:cTn>
+                              </p:par>
+                              <p:par>
+                                <p:cTn id="7" presetID="1" presetClass="entr" presetSubtype="0" fill="hold" nodeType="withEffect">
+                                  <p:stCondLst>
+                                    <p:cond delay="0"/>
+                                  </p:stCondLst>
+                                  <p:childTnLst>
+                                    <p:set>
+                                      <p:cBhvr>
+                                        <p:cTn id="8" dur="1" fill="hold">
+                                          <p:stCondLst>
+                                            <p:cond delay="0"/>
+                                          </p:stCondLst>
+                                        </p:cTn>
+                                        <p:tgtEl>
+                                          <p:spTgt spid="3">
+                                            <p:txEl>
+                                              <p:pRg st="5" end="5"/>
+                                            </p:txEl>
+                                          </p:spTgt>
+                                        </p:tgtEl>
+                                        <p:attrNameLst>
+                                          <p:attrName>style.visibility</p:attrName>
+                                        </p:attrNameLst>
+                                      </p:cBhvr>
+                                      <p:to>
+                                        <p:strVal val="visible"/>
+                                      </p:to>
+                                    </p:set>
+                                  </p:childTnLst>
+                                </p:cTn>
+                              </p:par>
+                            </p:childTnLst>
+                          </p:cTn>
+                        </p:par>
+                      </p:childTnLst>
+                    </p:cTn>
+                  </p:par>
+                </p:childTnLst>
+              </p:cTn>
+              <p:prevCondLst>
+                <p:cond evt="onPrev" delay="0">
+                  <p:tgtEl>
+                    <p:sldTgt/>
+                  </p:tgtEl>
+                </p:cond>
+              </p:prevCondLst>
+              <p:nextCondLst>
+                <p:cond evt="onNext" delay="0">
+                  <p:tgtEl>
+                    <p:sldTgt/>
+                  </p:tgtEl>
+                </p:cond>
+              </p:nextCondLst>
+            </p:seq>
+          </p:childTnLst>
+        </p:cTn>
+      </p:par>
+    </p:tnLst>
+  </p:timing>
 </p:sld>
 </file>
 

</xml_diff>